<commit_message>
updating slides with notes
</commit_message>
<xml_diff>
--- a/Documentation/MScResearchProjectPresentation_SeánÓFithcheallaigh_B00830189.pptx
+++ b/Documentation/MScResearchProjectPresentation_SeánÓFithcheallaigh_B00830189.pptx
@@ -944,7 +944,7 @@
           <a:p>
             <a:fld id="{A8417EDE-5002-433A-8CAD-066E842F3F10}" type="datetimeFigureOut">
               <a:rPr lang="en-GB" smtClean="0"/>
-              <a:t>20/05/2023</a:t>
+              <a:t>21/05/2023</a:t>
             </a:fld>
             <a:endParaRPr lang="en-GB"/>
           </a:p>
@@ -1267,7 +1267,7 @@
           <a:p>
             <a:r>
               <a:rPr lang="en-GB" dirty="0"/>
-              <a:t>I’d like to thank everyone for coming along to listen to my presentation for my MSc research project which was based on the development of a constrained device, for people with visual impairments</a:t>
+              <a:t>I’d like to thank everyone for coming along to listen to my presentation for my research project which was based on the development of a constrained device, for people with visual impairments</a:t>
             </a:r>
           </a:p>
           <a:p>
@@ -1308,6 +1308,764 @@
     <p:extLst>
       <p:ext uri="{BB962C8B-B14F-4D97-AF65-F5344CB8AC3E}">
         <p14:creationId xmlns:p14="http://schemas.microsoft.com/office/powerpoint/2010/main" val="485604089"/>
+      </p:ext>
+    </p:extLst>
+  </p:cSld>
+  <p:clrMapOvr>
+    <a:masterClrMapping/>
+  </p:clrMapOvr>
+</p:notes>
+</file>
+
+<file path=ppt/notesSlides/notesSlide10.xml><?xml version="1.0" encoding="utf-8"?>
+<p:notes xmlns:a="http://schemas.openxmlformats.org/drawingml/2006/main" xmlns:r="http://schemas.openxmlformats.org/officeDocument/2006/relationships" xmlns:p="http://schemas.openxmlformats.org/presentationml/2006/main">
+  <p:cSld>
+    <p:spTree>
+      <p:nvGrpSpPr>
+        <p:cNvPr id="1" name=""/>
+        <p:cNvGrpSpPr/>
+        <p:nvPr/>
+      </p:nvGrpSpPr>
+      <p:grpSpPr>
+        <a:xfrm>
+          <a:off x="0" y="0"/>
+          <a:ext cx="0" cy="0"/>
+          <a:chOff x="0" y="0"/>
+          <a:chExt cx="0" cy="0"/>
+        </a:xfrm>
+      </p:grpSpPr>
+      <p:sp>
+        <p:nvSpPr>
+          <p:cNvPr id="2" name="Slide Image Placeholder 1"/>
+          <p:cNvSpPr>
+            <a:spLocks noGrp="1" noRot="1" noChangeAspect="1"/>
+          </p:cNvSpPr>
+          <p:nvPr>
+            <p:ph type="sldImg"/>
+          </p:nvPr>
+        </p:nvSpPr>
+        <p:spPr/>
+      </p:sp>
+      <p:sp>
+        <p:nvSpPr>
+          <p:cNvPr id="3" name="Notes Placeholder 2"/>
+          <p:cNvSpPr>
+            <a:spLocks noGrp="1"/>
+          </p:cNvSpPr>
+          <p:nvPr>
+            <p:ph type="body" idx="1"/>
+          </p:nvPr>
+        </p:nvSpPr>
+        <p:spPr/>
+        <p:txBody>
+          <a:bodyPr/>
+          <a:lstStyle/>
+          <a:p>
+            <a:r>
+              <a:rPr lang="en-GB" dirty="0"/>
+              <a:t>After these experiments I found that a dense network consisting of 4 layers, with 2 neurons on the input layer to represent the two channels of data, 20 neurons each on the hidden layers and 10 neurons on the output layer, to </a:t>
+            </a:r>
+            <a:r>
+              <a:rPr lang="en-GB" dirty="0" err="1"/>
+              <a:t>replresent</a:t>
+            </a:r>
+            <a:r>
+              <a:rPr lang="en-GB" dirty="0"/>
+              <a:t> the 10 potential outcomes – the 9 grid positions plus no obstacles</a:t>
+            </a:r>
+          </a:p>
+          <a:p>
+            <a:endParaRPr lang="en-GB" dirty="0"/>
+          </a:p>
+          <a:p>
+            <a:r>
+              <a:rPr lang="en-GB" dirty="0"/>
+              <a:t>We can see from the scores here, particularly the f1 score, that the model preforms very well with an accuracy of 95%</a:t>
+            </a:r>
+          </a:p>
+        </p:txBody>
+      </p:sp>
+      <p:sp>
+        <p:nvSpPr>
+          <p:cNvPr id="4" name="Slide Number Placeholder 3"/>
+          <p:cNvSpPr>
+            <a:spLocks noGrp="1"/>
+          </p:cNvSpPr>
+          <p:nvPr>
+            <p:ph type="sldNum" sz="quarter" idx="5"/>
+          </p:nvPr>
+        </p:nvSpPr>
+        <p:spPr/>
+        <p:txBody>
+          <a:bodyPr/>
+          <a:lstStyle/>
+          <a:p>
+            <a:fld id="{A291FEE6-3CE6-48D3-A539-66492A8C3EBF}" type="slidenum">
+              <a:rPr lang="en-GB" smtClean="0"/>
+              <a:t>10</a:t>
+            </a:fld>
+            <a:endParaRPr lang="en-GB"/>
+          </a:p>
+        </p:txBody>
+      </p:sp>
+    </p:spTree>
+    <p:extLst>
+      <p:ext uri="{BB962C8B-B14F-4D97-AF65-F5344CB8AC3E}">
+        <p14:creationId xmlns:p14="http://schemas.microsoft.com/office/powerpoint/2010/main" val="4150774950"/>
+      </p:ext>
+    </p:extLst>
+  </p:cSld>
+  <p:clrMapOvr>
+    <a:masterClrMapping/>
+  </p:clrMapOvr>
+</p:notes>
+</file>
+
+<file path=ppt/notesSlides/notesSlide11.xml><?xml version="1.0" encoding="utf-8"?>
+<p:notes xmlns:a="http://schemas.openxmlformats.org/drawingml/2006/main" xmlns:r="http://schemas.openxmlformats.org/officeDocument/2006/relationships" xmlns:p="http://schemas.openxmlformats.org/presentationml/2006/main">
+  <p:cSld>
+    <p:spTree>
+      <p:nvGrpSpPr>
+        <p:cNvPr id="1" name=""/>
+        <p:cNvGrpSpPr/>
+        <p:nvPr/>
+      </p:nvGrpSpPr>
+      <p:grpSpPr>
+        <a:xfrm>
+          <a:off x="0" y="0"/>
+          <a:ext cx="0" cy="0"/>
+          <a:chOff x="0" y="0"/>
+          <a:chExt cx="0" cy="0"/>
+        </a:xfrm>
+      </p:grpSpPr>
+      <p:sp>
+        <p:nvSpPr>
+          <p:cNvPr id="2" name="Slide Image Placeholder 1"/>
+          <p:cNvSpPr>
+            <a:spLocks noGrp="1" noRot="1" noChangeAspect="1"/>
+          </p:cNvSpPr>
+          <p:nvPr>
+            <p:ph type="sldImg"/>
+          </p:nvPr>
+        </p:nvSpPr>
+        <p:spPr/>
+      </p:sp>
+      <p:sp>
+        <p:nvSpPr>
+          <p:cNvPr id="3" name="Notes Placeholder 2"/>
+          <p:cNvSpPr>
+            <a:spLocks noGrp="1"/>
+          </p:cNvSpPr>
+          <p:nvPr>
+            <p:ph type="body" idx="1"/>
+          </p:nvPr>
+        </p:nvSpPr>
+        <p:spPr/>
+        <p:txBody>
+          <a:bodyPr/>
+          <a:lstStyle/>
+          <a:p>
+            <a:r>
+              <a:rPr lang="en-GB" dirty="0"/>
+              <a:t>So now we move into the final phase – deploying the model onto a constrained device</a:t>
+            </a:r>
+          </a:p>
+          <a:p>
+            <a:endParaRPr lang="en-GB" dirty="0"/>
+          </a:p>
+          <a:p>
+            <a:r>
+              <a:rPr lang="en-GB" dirty="0"/>
+              <a:t>The first step to deploying the model was to convert it to a header file, or a .h file which can be done within TensorFlow</a:t>
+            </a:r>
+          </a:p>
+          <a:p>
+            <a:endParaRPr lang="en-GB" dirty="0"/>
+          </a:p>
+          <a:p>
+            <a:pPr marL="0" marR="0" lvl="0" indent="0" algn="l" defTabSz="914400" rtl="0" eaLnBrk="1" fontAlgn="auto" latinLnBrk="0" hangingPunct="1">
+              <a:lnSpc>
+                <a:spcPct val="100000"/>
+              </a:lnSpc>
+              <a:spcBef>
+                <a:spcPts val="0"/>
+              </a:spcBef>
+              <a:spcAft>
+                <a:spcPts val="0"/>
+              </a:spcAft>
+              <a:buClrTx/>
+              <a:buSzTx/>
+              <a:buFontTx/>
+              <a:buNone/>
+              <a:tabLst/>
+              <a:defRPr/>
+            </a:pPr>
+            <a:r>
+              <a:rPr lang="en-GB" dirty="0"/>
+              <a:t>Next, </a:t>
+            </a:r>
+            <a:r>
+              <a:rPr lang="en-GB" sz="1200" dirty="0"/>
+              <a:t>the header file can be imported into the microcontroller to be used with TensorFlow Lite.</a:t>
+            </a:r>
+          </a:p>
+          <a:p>
+            <a:pPr marL="0" marR="0" lvl="0" indent="0" algn="l" defTabSz="914400" rtl="0" eaLnBrk="1" fontAlgn="auto" latinLnBrk="0" hangingPunct="1">
+              <a:lnSpc>
+                <a:spcPct val="100000"/>
+              </a:lnSpc>
+              <a:spcBef>
+                <a:spcPts val="0"/>
+              </a:spcBef>
+              <a:spcAft>
+                <a:spcPts val="0"/>
+              </a:spcAft>
+              <a:buClrTx/>
+              <a:buSzTx/>
+              <a:buFontTx/>
+              <a:buNone/>
+              <a:tabLst/>
+              <a:defRPr/>
+            </a:pPr>
+            <a:endParaRPr lang="en-GB" sz="1200" dirty="0"/>
+          </a:p>
+          <a:p>
+            <a:pPr marL="0" marR="0" lvl="0" indent="0" algn="l" defTabSz="914400" rtl="0" eaLnBrk="1" fontAlgn="auto" latinLnBrk="0" hangingPunct="1">
+              <a:lnSpc>
+                <a:spcPct val="100000"/>
+              </a:lnSpc>
+              <a:spcBef>
+                <a:spcPts val="0"/>
+              </a:spcBef>
+              <a:spcAft>
+                <a:spcPts val="0"/>
+              </a:spcAft>
+              <a:buClrTx/>
+              <a:buSzTx/>
+              <a:buFontTx/>
+              <a:buNone/>
+              <a:tabLst/>
+              <a:defRPr/>
+            </a:pPr>
+            <a:r>
+              <a:rPr lang="en-GB" sz="1200" dirty="0"/>
+              <a:t>With this all completed, I carried out some tests, going back to the same objects and grid system, but I didn’t get any output from the inference.</a:t>
+            </a:r>
+          </a:p>
+          <a:p>
+            <a:pPr marL="0" marR="0" lvl="0" indent="0" algn="l" defTabSz="914400" rtl="0" eaLnBrk="1" fontAlgn="auto" latinLnBrk="0" hangingPunct="1">
+              <a:lnSpc>
+                <a:spcPct val="100000"/>
+              </a:lnSpc>
+              <a:spcBef>
+                <a:spcPts val="0"/>
+              </a:spcBef>
+              <a:spcAft>
+                <a:spcPts val="0"/>
+              </a:spcAft>
+              <a:buClrTx/>
+              <a:buSzTx/>
+              <a:buFontTx/>
+              <a:buNone/>
+              <a:tabLst/>
+              <a:defRPr/>
+            </a:pPr>
+            <a:endParaRPr lang="en-GB" sz="1200" dirty="0"/>
+          </a:p>
+          <a:p>
+            <a:pPr marL="0" marR="0" lvl="0" indent="0" algn="l" defTabSz="914400" rtl="0" eaLnBrk="1" fontAlgn="auto" latinLnBrk="0" hangingPunct="1">
+              <a:lnSpc>
+                <a:spcPct val="100000"/>
+              </a:lnSpc>
+              <a:spcBef>
+                <a:spcPts val="0"/>
+              </a:spcBef>
+              <a:spcAft>
+                <a:spcPts val="0"/>
+              </a:spcAft>
+              <a:buClrTx/>
+              <a:buSzTx/>
+              <a:buFontTx/>
+              <a:buNone/>
+              <a:tabLst/>
+              <a:defRPr/>
+            </a:pPr>
+            <a:r>
+              <a:rPr lang="en-GB" sz="1200" dirty="0"/>
+              <a:t>Investigations and research pointed towards the possibility that the shape of the data being passed for inference was wrong.</a:t>
+            </a:r>
+          </a:p>
+          <a:p>
+            <a:pPr marL="0" marR="0" lvl="0" indent="0" algn="l" defTabSz="914400" rtl="0" eaLnBrk="1" fontAlgn="auto" latinLnBrk="0" hangingPunct="1">
+              <a:lnSpc>
+                <a:spcPct val="100000"/>
+              </a:lnSpc>
+              <a:spcBef>
+                <a:spcPts val="0"/>
+              </a:spcBef>
+              <a:spcAft>
+                <a:spcPts val="0"/>
+              </a:spcAft>
+              <a:buClrTx/>
+              <a:buSzTx/>
+              <a:buFontTx/>
+              <a:buNone/>
+              <a:tabLst/>
+              <a:defRPr/>
+            </a:pPr>
+            <a:r>
+              <a:rPr lang="en-GB" sz="1200" dirty="0"/>
+              <a:t>This was investigated further to understand what the shape should be, and the code was modified to take this shape into account.</a:t>
+            </a:r>
+          </a:p>
+          <a:p>
+            <a:pPr marL="0" marR="0" lvl="0" indent="0" algn="l" defTabSz="914400" rtl="0" eaLnBrk="1" fontAlgn="auto" latinLnBrk="0" hangingPunct="1">
+              <a:lnSpc>
+                <a:spcPct val="100000"/>
+              </a:lnSpc>
+              <a:spcBef>
+                <a:spcPts val="0"/>
+              </a:spcBef>
+              <a:spcAft>
+                <a:spcPts val="0"/>
+              </a:spcAft>
+              <a:buClrTx/>
+              <a:buSzTx/>
+              <a:buFontTx/>
+              <a:buNone/>
+              <a:tabLst/>
+              <a:defRPr/>
+            </a:pPr>
+            <a:r>
+              <a:rPr lang="en-GB" sz="1200" dirty="0"/>
+              <a:t>I also modified the code to strip it back to as simple a system as possible, so I put data used for training the models into two separate header files which could be imported and passed into the input tensor for inference</a:t>
+            </a:r>
+          </a:p>
+          <a:p>
+            <a:pPr marL="0" marR="0" lvl="0" indent="0" algn="l" defTabSz="914400" rtl="0" eaLnBrk="1" fontAlgn="auto" latinLnBrk="0" hangingPunct="1">
+              <a:lnSpc>
+                <a:spcPct val="100000"/>
+              </a:lnSpc>
+              <a:spcBef>
+                <a:spcPts val="0"/>
+              </a:spcBef>
+              <a:spcAft>
+                <a:spcPts val="0"/>
+              </a:spcAft>
+              <a:buClrTx/>
+              <a:buSzTx/>
+              <a:buFontTx/>
+              <a:buNone/>
+              <a:tabLst/>
+              <a:defRPr/>
+            </a:pPr>
+            <a:endParaRPr lang="en-GB" sz="1200" dirty="0"/>
+          </a:p>
+          <a:p>
+            <a:pPr marL="0" marR="0" lvl="0" indent="0" algn="l" defTabSz="914400" rtl="0" eaLnBrk="1" fontAlgn="auto" latinLnBrk="0" hangingPunct="1">
+              <a:lnSpc>
+                <a:spcPct val="100000"/>
+              </a:lnSpc>
+              <a:spcBef>
+                <a:spcPts val="0"/>
+              </a:spcBef>
+              <a:spcAft>
+                <a:spcPts val="0"/>
+              </a:spcAft>
+              <a:buClrTx/>
+              <a:buSzTx/>
+              <a:buFontTx/>
+              <a:buNone/>
+              <a:tabLst/>
+              <a:defRPr/>
+            </a:pPr>
+            <a:r>
+              <a:rPr lang="en-GB" sz="1200" dirty="0"/>
+              <a:t>The system started to produce results, but it also retuned the same grid number, or series of grid numbers no matter what data was passed to it.</a:t>
+            </a:r>
+          </a:p>
+          <a:p>
+            <a:pPr marL="0" marR="0" lvl="0" indent="0" algn="l" defTabSz="914400" rtl="0" eaLnBrk="1" fontAlgn="auto" latinLnBrk="0" hangingPunct="1">
+              <a:lnSpc>
+                <a:spcPct val="100000"/>
+              </a:lnSpc>
+              <a:spcBef>
+                <a:spcPts val="0"/>
+              </a:spcBef>
+              <a:spcAft>
+                <a:spcPts val="0"/>
+              </a:spcAft>
+              <a:buClrTx/>
+              <a:buSzTx/>
+              <a:buFontTx/>
+              <a:buNone/>
+              <a:tabLst/>
+              <a:defRPr/>
+            </a:pPr>
+            <a:endParaRPr lang="en-GB" sz="1200" dirty="0"/>
+          </a:p>
+          <a:p>
+            <a:pPr marL="0" marR="0" lvl="0" indent="0" algn="l" defTabSz="914400" rtl="0" eaLnBrk="1" fontAlgn="auto" latinLnBrk="0" hangingPunct="1">
+              <a:lnSpc>
+                <a:spcPct val="100000"/>
+              </a:lnSpc>
+              <a:spcBef>
+                <a:spcPts val="0"/>
+              </a:spcBef>
+              <a:spcAft>
+                <a:spcPts val="0"/>
+              </a:spcAft>
+              <a:buClrTx/>
+              <a:buSzTx/>
+              <a:buFontTx/>
+              <a:buNone/>
+              <a:tabLst/>
+              <a:defRPr/>
+            </a:pPr>
+            <a:endParaRPr lang="en-GB" sz="1200" dirty="0"/>
+          </a:p>
+          <a:p>
+            <a:pPr marL="0" marR="0" lvl="0" indent="0" algn="l" defTabSz="914400" rtl="0" eaLnBrk="1" fontAlgn="auto" latinLnBrk="0" hangingPunct="1">
+              <a:lnSpc>
+                <a:spcPct val="100000"/>
+              </a:lnSpc>
+              <a:spcBef>
+                <a:spcPts val="0"/>
+              </a:spcBef>
+              <a:spcAft>
+                <a:spcPts val="0"/>
+              </a:spcAft>
+              <a:buClrTx/>
+              <a:buSzTx/>
+              <a:buFontTx/>
+              <a:buNone/>
+              <a:tabLst/>
+              <a:defRPr/>
+            </a:pPr>
+            <a:endParaRPr lang="en-GB" sz="1200" dirty="0"/>
+          </a:p>
+          <a:p>
+            <a:pPr marL="0" marR="0" lvl="0" indent="0" algn="l" defTabSz="914400" rtl="0" eaLnBrk="1" fontAlgn="auto" latinLnBrk="0" hangingPunct="1">
+              <a:lnSpc>
+                <a:spcPct val="100000"/>
+              </a:lnSpc>
+              <a:spcBef>
+                <a:spcPts val="0"/>
+              </a:spcBef>
+              <a:spcAft>
+                <a:spcPts val="0"/>
+              </a:spcAft>
+              <a:buClrTx/>
+              <a:buSzTx/>
+              <a:buFontTx/>
+              <a:buNone/>
+              <a:tabLst/>
+              <a:defRPr/>
+            </a:pPr>
+            <a:endParaRPr lang="en-GB" sz="1200" dirty="0"/>
+          </a:p>
+          <a:p>
+            <a:endParaRPr lang="en-GB" dirty="0"/>
+          </a:p>
+        </p:txBody>
+      </p:sp>
+      <p:sp>
+        <p:nvSpPr>
+          <p:cNvPr id="4" name="Slide Number Placeholder 3"/>
+          <p:cNvSpPr>
+            <a:spLocks noGrp="1"/>
+          </p:cNvSpPr>
+          <p:nvPr>
+            <p:ph type="sldNum" sz="quarter" idx="5"/>
+          </p:nvPr>
+        </p:nvSpPr>
+        <p:spPr/>
+        <p:txBody>
+          <a:bodyPr/>
+          <a:lstStyle/>
+          <a:p>
+            <a:fld id="{A291FEE6-3CE6-48D3-A539-66492A8C3EBF}" type="slidenum">
+              <a:rPr lang="en-GB" smtClean="0"/>
+              <a:t>11</a:t>
+            </a:fld>
+            <a:endParaRPr lang="en-GB"/>
+          </a:p>
+        </p:txBody>
+      </p:sp>
+    </p:spTree>
+    <p:extLst>
+      <p:ext uri="{BB962C8B-B14F-4D97-AF65-F5344CB8AC3E}">
+        <p14:creationId xmlns:p14="http://schemas.microsoft.com/office/powerpoint/2010/main" val="1474077640"/>
+      </p:ext>
+    </p:extLst>
+  </p:cSld>
+  <p:clrMapOvr>
+    <a:masterClrMapping/>
+  </p:clrMapOvr>
+</p:notes>
+</file>
+
+<file path=ppt/notesSlides/notesSlide12.xml><?xml version="1.0" encoding="utf-8"?>
+<p:notes xmlns:a="http://schemas.openxmlformats.org/drawingml/2006/main" xmlns:r="http://schemas.openxmlformats.org/officeDocument/2006/relationships" xmlns:p="http://schemas.openxmlformats.org/presentationml/2006/main">
+  <p:cSld>
+    <p:spTree>
+      <p:nvGrpSpPr>
+        <p:cNvPr id="1" name=""/>
+        <p:cNvGrpSpPr/>
+        <p:nvPr/>
+      </p:nvGrpSpPr>
+      <p:grpSpPr>
+        <a:xfrm>
+          <a:off x="0" y="0"/>
+          <a:ext cx="0" cy="0"/>
+          <a:chOff x="0" y="0"/>
+          <a:chExt cx="0" cy="0"/>
+        </a:xfrm>
+      </p:grpSpPr>
+      <p:sp>
+        <p:nvSpPr>
+          <p:cNvPr id="2" name="Slide Image Placeholder 1"/>
+          <p:cNvSpPr>
+            <a:spLocks noGrp="1" noRot="1" noChangeAspect="1"/>
+          </p:cNvSpPr>
+          <p:nvPr>
+            <p:ph type="sldImg"/>
+          </p:nvPr>
+        </p:nvSpPr>
+        <p:spPr/>
+      </p:sp>
+      <p:sp>
+        <p:nvSpPr>
+          <p:cNvPr id="3" name="Notes Placeholder 2"/>
+          <p:cNvSpPr>
+            <a:spLocks noGrp="1"/>
+          </p:cNvSpPr>
+          <p:nvPr>
+            <p:ph type="body" idx="1"/>
+          </p:nvPr>
+        </p:nvSpPr>
+        <p:spPr/>
+        <p:txBody>
+          <a:bodyPr/>
+          <a:lstStyle/>
+          <a:p>
+            <a:r>
+              <a:rPr lang="en-GB" dirty="0"/>
+              <a:t>So, to review:</a:t>
+            </a:r>
+          </a:p>
+          <a:p>
+            <a:endParaRPr lang="en-GB" dirty="0"/>
+          </a:p>
+          <a:p>
+            <a:pPr marL="171450" marR="0" lvl="0" indent="-171450" algn="l" defTabSz="914400" rtl="0" eaLnBrk="1" fontAlgn="auto" latinLnBrk="0" hangingPunct="1">
+              <a:lnSpc>
+                <a:spcPct val="100000"/>
+              </a:lnSpc>
+              <a:spcBef>
+                <a:spcPts val="0"/>
+              </a:spcBef>
+              <a:spcAft>
+                <a:spcPts val="0"/>
+              </a:spcAft>
+              <a:buClrTx/>
+              <a:buSzTx/>
+              <a:buFont typeface="Arial" panose="020B0604020202020204" pitchFamily="34" charset="0"/>
+              <a:buChar char="•"/>
+              <a:tabLst/>
+              <a:defRPr/>
+            </a:pPr>
+            <a:r>
+              <a:rPr lang="en-GB" sz="1200" dirty="0"/>
+              <a:t>A large dataset was created by gathering ultrasonic distance data from a number of obstacles using a grid system</a:t>
+            </a:r>
+          </a:p>
+          <a:p>
+            <a:pPr marL="171450" indent="-171450">
+              <a:buFont typeface="Arial" panose="020B0604020202020204" pitchFamily="34" charset="0"/>
+              <a:buChar char="•"/>
+            </a:pPr>
+            <a:endParaRPr lang="en-GB" dirty="0"/>
+          </a:p>
+          <a:p>
+            <a:pPr marL="171450" marR="0" lvl="0" indent="-171450" algn="l" defTabSz="914400" rtl="0" eaLnBrk="1" fontAlgn="auto" latinLnBrk="0" hangingPunct="1">
+              <a:lnSpc>
+                <a:spcPct val="100000"/>
+              </a:lnSpc>
+              <a:spcBef>
+                <a:spcPts val="0"/>
+              </a:spcBef>
+              <a:spcAft>
+                <a:spcPts val="0"/>
+              </a:spcAft>
+              <a:buClrTx/>
+              <a:buSzTx/>
+              <a:buFont typeface="Arial" panose="020B0604020202020204" pitchFamily="34" charset="0"/>
+              <a:buChar char="•"/>
+              <a:tabLst/>
+              <a:defRPr/>
+            </a:pPr>
+            <a:r>
+              <a:rPr lang="en-GB" sz="1200" dirty="0"/>
+              <a:t>Initial analysis indicated that detecting obstacles was possible, but standard machine learning techniques alone were not sufficient</a:t>
+            </a:r>
+          </a:p>
+          <a:p>
+            <a:pPr marL="171450" indent="-171450">
+              <a:buFont typeface="Arial" panose="020B0604020202020204" pitchFamily="34" charset="0"/>
+              <a:buChar char="•"/>
+            </a:pPr>
+            <a:endParaRPr lang="en-GB" dirty="0"/>
+          </a:p>
+          <a:p>
+            <a:pPr marL="171450" marR="0" lvl="0" indent="-171450" algn="l" defTabSz="914400" rtl="0" eaLnBrk="1" fontAlgn="auto" latinLnBrk="0" hangingPunct="1">
+              <a:lnSpc>
+                <a:spcPct val="100000"/>
+              </a:lnSpc>
+              <a:spcBef>
+                <a:spcPts val="0"/>
+              </a:spcBef>
+              <a:spcAft>
+                <a:spcPts val="0"/>
+              </a:spcAft>
+              <a:buClrTx/>
+              <a:buSzTx/>
+              <a:buFont typeface="Arial" panose="020B0604020202020204" pitchFamily="34" charset="0"/>
+              <a:buChar char="•"/>
+              <a:tabLst/>
+              <a:defRPr/>
+            </a:pPr>
+            <a:r>
+              <a:rPr lang="en-GB" sz="1200" dirty="0"/>
+              <a:t>Initial development of neural network proved promising with good accuracy scores</a:t>
+            </a:r>
+          </a:p>
+          <a:p>
+            <a:pPr marL="171450" indent="-171450">
+              <a:buFont typeface="Arial" panose="020B0604020202020204" pitchFamily="34" charset="0"/>
+              <a:buChar char="•"/>
+            </a:pPr>
+            <a:endParaRPr lang="en-GB" dirty="0"/>
+          </a:p>
+          <a:p>
+            <a:pPr marL="171450" marR="0" lvl="0" indent="-171450" algn="l" defTabSz="914400" rtl="0" eaLnBrk="1" fontAlgn="auto" latinLnBrk="0" hangingPunct="1">
+              <a:lnSpc>
+                <a:spcPct val="100000"/>
+              </a:lnSpc>
+              <a:spcBef>
+                <a:spcPts val="0"/>
+              </a:spcBef>
+              <a:spcAft>
+                <a:spcPts val="0"/>
+              </a:spcAft>
+              <a:buClrTx/>
+              <a:buSzTx/>
+              <a:buFont typeface="Arial" panose="020B0604020202020204" pitchFamily="34" charset="0"/>
+              <a:buChar char="•"/>
+              <a:tabLst/>
+              <a:defRPr/>
+            </a:pPr>
+            <a:r>
+              <a:rPr lang="en-GB" sz="1200" dirty="0"/>
+              <a:t>Deploying the model onto the constrained device generated several challenges, which have not been fully overcome</a:t>
+            </a:r>
+          </a:p>
+          <a:p>
+            <a:pPr marL="171450" indent="-171450">
+              <a:buFont typeface="Arial" panose="020B0604020202020204" pitchFamily="34" charset="0"/>
+              <a:buChar char="•"/>
+            </a:pPr>
+            <a:endParaRPr lang="en-GB" dirty="0"/>
+          </a:p>
+          <a:p>
+            <a:pPr marL="171450" marR="0" lvl="0" indent="-171450" algn="l" defTabSz="914400" rtl="0" eaLnBrk="1" fontAlgn="auto" latinLnBrk="0" hangingPunct="1">
+              <a:lnSpc>
+                <a:spcPct val="100000"/>
+              </a:lnSpc>
+              <a:spcBef>
+                <a:spcPts val="0"/>
+              </a:spcBef>
+              <a:spcAft>
+                <a:spcPts val="0"/>
+              </a:spcAft>
+              <a:buClrTx/>
+              <a:buSzTx/>
+              <a:buFont typeface="Arial" panose="020B0604020202020204" pitchFamily="34" charset="0"/>
+              <a:buChar char="•"/>
+              <a:tabLst/>
+              <a:defRPr/>
+            </a:pPr>
+            <a:r>
+              <a:rPr lang="en-GB" sz="1200" dirty="0"/>
+              <a:t>If these challenges could be overcome, this work has shown the potential to develop a system which could be used by people with visual impairments to navigate an unfamiliar indoor environment</a:t>
+            </a:r>
+          </a:p>
+          <a:p>
+            <a:pPr marL="171450" indent="-171450">
+              <a:buFont typeface="Arial" panose="020B0604020202020204" pitchFamily="34" charset="0"/>
+              <a:buChar char="•"/>
+            </a:pPr>
+            <a:endParaRPr lang="en-GB" dirty="0"/>
+          </a:p>
+          <a:p>
+            <a:pPr marL="171450" marR="0" lvl="0" indent="-171450" algn="l" defTabSz="914400" rtl="0" eaLnBrk="1" fontAlgn="auto" latinLnBrk="0" hangingPunct="1">
+              <a:lnSpc>
+                <a:spcPct val="100000"/>
+              </a:lnSpc>
+              <a:spcBef>
+                <a:spcPts val="0"/>
+              </a:spcBef>
+              <a:spcAft>
+                <a:spcPts val="0"/>
+              </a:spcAft>
+              <a:buClrTx/>
+              <a:buSzTx/>
+              <a:buFont typeface="Arial" panose="020B0604020202020204" pitchFamily="34" charset="0"/>
+              <a:buChar char="•"/>
+              <a:tabLst/>
+              <a:defRPr/>
+            </a:pPr>
+            <a:r>
+              <a:rPr lang="en-GB" sz="1200" dirty="0"/>
+              <a:t>To confirm this, further development of the neural network would need to be carried out by repeating the processing of passing unseen or hold out data to the network to fully understand the performance</a:t>
+            </a:r>
+          </a:p>
+          <a:p>
+            <a:pPr marL="171450" indent="-171450">
+              <a:buFont typeface="Arial" panose="020B0604020202020204" pitchFamily="34" charset="0"/>
+              <a:buChar char="•"/>
+            </a:pPr>
+            <a:endParaRPr lang="en-GB" dirty="0"/>
+          </a:p>
+        </p:txBody>
+      </p:sp>
+      <p:sp>
+        <p:nvSpPr>
+          <p:cNvPr id="4" name="Slide Number Placeholder 3"/>
+          <p:cNvSpPr>
+            <a:spLocks noGrp="1"/>
+          </p:cNvSpPr>
+          <p:nvPr>
+            <p:ph type="sldNum" sz="quarter" idx="5"/>
+          </p:nvPr>
+        </p:nvSpPr>
+        <p:spPr/>
+        <p:txBody>
+          <a:bodyPr/>
+          <a:lstStyle/>
+          <a:p>
+            <a:fld id="{A291FEE6-3CE6-48D3-A539-66492A8C3EBF}" type="slidenum">
+              <a:rPr lang="en-GB" smtClean="0"/>
+              <a:t>12</a:t>
+            </a:fld>
+            <a:endParaRPr lang="en-GB"/>
+          </a:p>
+        </p:txBody>
+      </p:sp>
+    </p:spTree>
+    <p:extLst>
+      <p:ext uri="{BB962C8B-B14F-4D97-AF65-F5344CB8AC3E}">
+        <p14:creationId xmlns:p14="http://schemas.microsoft.com/office/powerpoint/2010/main" val="3832649637"/>
       </p:ext>
     </p:extLst>
   </p:cSld>
@@ -1373,6 +2131,15 @@
             <a:r>
               <a:rPr lang="en-GB" dirty="0"/>
               <a:t>We’ll start off with a quick discussion on the background of my project and talk about some of the related work</a:t>
+            </a:r>
+          </a:p>
+          <a:p>
+            <a:endParaRPr lang="en-GB" dirty="0"/>
+          </a:p>
+          <a:p>
+            <a:r>
+              <a:rPr lang="en-GB" dirty="0"/>
+              <a:t>I will discuss the aims and objectives</a:t>
             </a:r>
           </a:p>
           <a:p>
@@ -1973,7 +2740,7 @@
           <a:p>
             <a:r>
               <a:rPr lang="en-GB" dirty="0"/>
-              <a:t>Several large object were selected for the data collection, specifically a large bin, a storage box, a display stand and a closed door – large items that you might find in a hallway in an office say.</a:t>
+              <a:t>Several large object were selected for the data collection, specifically a large bin, a storage box, a display stand and a closed door – obstacles that you might find in a hallway in an office say.</a:t>
             </a:r>
           </a:p>
           <a:p>
@@ -2224,13 +2991,29 @@
           <a:p>
             <a:r>
               <a:rPr lang="en-GB" dirty="0"/>
-              <a:t>To do this I trained the algorithms in three of the data sets, leaving 1 dataset out. This 1 dataset would then be used to test the model. This meant the that models would never have “seen” </a:t>
-            </a:r>
-            <a:r>
-              <a:rPr lang="en-GB"/>
-              <a:t>this data</a:t>
-            </a:r>
+              <a:t>To do this I trained the algorithms in three of the data sets, leaving 1 dataset out. This 1 dataset would then be used to test the model. This meant that models would never have “seen” this data.</a:t>
+            </a:r>
+          </a:p>
+          <a:p>
+            <a:r>
+              <a:rPr lang="en-GB" dirty="0"/>
+              <a:t>This dataset left out was rotated, so one dataset was left out once.</a:t>
+            </a:r>
+          </a:p>
+          <a:p>
             <a:endParaRPr lang="en-GB" dirty="0"/>
+          </a:p>
+          <a:p>
+            <a:r>
+              <a:rPr lang="en-GB" dirty="0"/>
+              <a:t>As before, I ran the data to see if an object could be detected at all, that’s the binary search, and we can see that the accuracy results during training are 100% for the DT and KNN algorithms. </a:t>
+            </a:r>
+          </a:p>
+          <a:p>
+            <a:r>
+              <a:rPr lang="en-GB" dirty="0"/>
+              <a:t>During the test phase, we can see that there is generally, a slight reduction in the accuracy scores.</a:t>
+            </a:r>
           </a:p>
         </p:txBody>
       </p:sp>
@@ -2261,6 +3044,239 @@
     <p:extLst>
       <p:ext uri="{BB962C8B-B14F-4D97-AF65-F5344CB8AC3E}">
         <p14:creationId xmlns:p14="http://schemas.microsoft.com/office/powerpoint/2010/main" val="187860247"/>
+      </p:ext>
+    </p:extLst>
+  </p:cSld>
+  <p:clrMapOvr>
+    <a:masterClrMapping/>
+  </p:clrMapOvr>
+</p:notes>
+</file>
+
+<file path=ppt/notesSlides/notesSlide8.xml><?xml version="1.0" encoding="utf-8"?>
+<p:notes xmlns:a="http://schemas.openxmlformats.org/drawingml/2006/main" xmlns:r="http://schemas.openxmlformats.org/officeDocument/2006/relationships" xmlns:p="http://schemas.openxmlformats.org/presentationml/2006/main">
+  <p:cSld>
+    <p:spTree>
+      <p:nvGrpSpPr>
+        <p:cNvPr id="1" name=""/>
+        <p:cNvGrpSpPr/>
+        <p:nvPr/>
+      </p:nvGrpSpPr>
+      <p:grpSpPr>
+        <a:xfrm>
+          <a:off x="0" y="0"/>
+          <a:ext cx="0" cy="0"/>
+          <a:chOff x="0" y="0"/>
+          <a:chExt cx="0" cy="0"/>
+        </a:xfrm>
+      </p:grpSpPr>
+      <p:sp>
+        <p:nvSpPr>
+          <p:cNvPr id="2" name="Slide Image Placeholder 1"/>
+          <p:cNvSpPr>
+            <a:spLocks noGrp="1" noRot="1" noChangeAspect="1"/>
+          </p:cNvSpPr>
+          <p:nvPr>
+            <p:ph type="sldImg"/>
+          </p:nvPr>
+        </p:nvSpPr>
+        <p:spPr/>
+      </p:sp>
+      <p:sp>
+        <p:nvSpPr>
+          <p:cNvPr id="3" name="Notes Placeholder 2"/>
+          <p:cNvSpPr>
+            <a:spLocks noGrp="1"/>
+          </p:cNvSpPr>
+          <p:nvPr>
+            <p:ph type="body" idx="1"/>
+          </p:nvPr>
+        </p:nvSpPr>
+        <p:spPr/>
+        <p:txBody>
+          <a:bodyPr/>
+          <a:lstStyle/>
+          <a:p>
+            <a:r>
+              <a:rPr lang="en-GB" dirty="0"/>
+              <a:t>The same was done for the grid analysis, and we can see an even bigger reduction in the accuracy scores during the testing phase.</a:t>
+            </a:r>
+          </a:p>
+          <a:p>
+            <a:endParaRPr lang="en-GB" dirty="0"/>
+          </a:p>
+          <a:p>
+            <a:r>
+              <a:rPr lang="en-GB" dirty="0"/>
+              <a:t>So, this analysis shows that what you might call standard classification algorithms have good accuracy scores when trying to determine if there is an object present or not, but they struggle when trying to detect an object from the grid data</a:t>
+            </a:r>
+          </a:p>
+          <a:p>
+            <a:endParaRPr lang="en-GB" dirty="0"/>
+          </a:p>
+          <a:p>
+            <a:r>
+              <a:rPr lang="en-GB" dirty="0"/>
+              <a:t>So, a new approach, neural networks were investigated</a:t>
+            </a:r>
+          </a:p>
+        </p:txBody>
+      </p:sp>
+      <p:sp>
+        <p:nvSpPr>
+          <p:cNvPr id="4" name="Slide Number Placeholder 3"/>
+          <p:cNvSpPr>
+            <a:spLocks noGrp="1"/>
+          </p:cNvSpPr>
+          <p:nvPr>
+            <p:ph type="sldNum" sz="quarter" idx="5"/>
+          </p:nvPr>
+        </p:nvSpPr>
+        <p:spPr/>
+        <p:txBody>
+          <a:bodyPr/>
+          <a:lstStyle/>
+          <a:p>
+            <a:fld id="{A291FEE6-3CE6-48D3-A539-66492A8C3EBF}" type="slidenum">
+              <a:rPr lang="en-GB" smtClean="0"/>
+              <a:t>8</a:t>
+            </a:fld>
+            <a:endParaRPr lang="en-GB"/>
+          </a:p>
+        </p:txBody>
+      </p:sp>
+    </p:spTree>
+    <p:extLst>
+      <p:ext uri="{BB962C8B-B14F-4D97-AF65-F5344CB8AC3E}">
+        <p14:creationId xmlns:p14="http://schemas.microsoft.com/office/powerpoint/2010/main" val="851501778"/>
+      </p:ext>
+    </p:extLst>
+  </p:cSld>
+  <p:clrMapOvr>
+    <a:masterClrMapping/>
+  </p:clrMapOvr>
+</p:notes>
+</file>
+
+<file path=ppt/notesSlides/notesSlide9.xml><?xml version="1.0" encoding="utf-8"?>
+<p:notes xmlns:a="http://schemas.openxmlformats.org/drawingml/2006/main" xmlns:r="http://schemas.openxmlformats.org/officeDocument/2006/relationships" xmlns:p="http://schemas.openxmlformats.org/presentationml/2006/main">
+  <p:cSld>
+    <p:spTree>
+      <p:nvGrpSpPr>
+        <p:cNvPr id="1" name=""/>
+        <p:cNvGrpSpPr/>
+        <p:nvPr/>
+      </p:nvGrpSpPr>
+      <p:grpSpPr>
+        <a:xfrm>
+          <a:off x="0" y="0"/>
+          <a:ext cx="0" cy="0"/>
+          <a:chOff x="0" y="0"/>
+          <a:chExt cx="0" cy="0"/>
+        </a:xfrm>
+      </p:grpSpPr>
+      <p:sp>
+        <p:nvSpPr>
+          <p:cNvPr id="2" name="Slide Image Placeholder 1"/>
+          <p:cNvSpPr>
+            <a:spLocks noGrp="1" noRot="1" noChangeAspect="1"/>
+          </p:cNvSpPr>
+          <p:nvPr>
+            <p:ph type="sldImg"/>
+          </p:nvPr>
+        </p:nvSpPr>
+        <p:spPr/>
+      </p:sp>
+      <p:sp>
+        <p:nvSpPr>
+          <p:cNvPr id="3" name="Notes Placeholder 2"/>
+          <p:cNvSpPr>
+            <a:spLocks noGrp="1"/>
+          </p:cNvSpPr>
+          <p:nvPr>
+            <p:ph type="body" idx="1"/>
+          </p:nvPr>
+        </p:nvSpPr>
+        <p:spPr/>
+        <p:txBody>
+          <a:bodyPr/>
+          <a:lstStyle/>
+          <a:p>
+            <a:r>
+              <a:rPr lang="en-GB" dirty="0"/>
+              <a:t>I used the </a:t>
+            </a:r>
+            <a:r>
+              <a:rPr lang="en-GB" dirty="0" err="1"/>
+              <a:t>Keras</a:t>
+            </a:r>
+            <a:r>
+              <a:rPr lang="en-GB" dirty="0"/>
+              <a:t> framework from TensorFlow to build a dense neural network.</a:t>
+            </a:r>
+          </a:p>
+          <a:p>
+            <a:endParaRPr lang="en-GB" dirty="0"/>
+          </a:p>
+          <a:p>
+            <a:r>
+              <a:rPr lang="en-GB" dirty="0"/>
+              <a:t>I varied the hyperparameters of the network to try and find the best accuracy and loss scores, and the image on the left here is just to give an idea of that process.</a:t>
+            </a:r>
+          </a:p>
+          <a:p>
+            <a:endParaRPr lang="en-GB" dirty="0"/>
+          </a:p>
+          <a:p>
+            <a:r>
+              <a:rPr lang="en-GB" dirty="0"/>
+              <a:t>The parameters I varied were the number of layers and the number of neurons, the learning late, the batch size, epochs and the optimisers</a:t>
+            </a:r>
+          </a:p>
+          <a:p>
+            <a:endParaRPr lang="en-GB" dirty="0"/>
+          </a:p>
+          <a:p>
+            <a:r>
+              <a:rPr lang="en-GB" dirty="0"/>
+              <a:t>A series of experiments were done, and all the results were logged in tables like this</a:t>
+            </a:r>
+          </a:p>
+          <a:p>
+            <a:endParaRPr lang="en-GB" dirty="0"/>
+          </a:p>
+          <a:p>
+            <a:endParaRPr lang="en-GB" dirty="0"/>
+          </a:p>
+        </p:txBody>
+      </p:sp>
+      <p:sp>
+        <p:nvSpPr>
+          <p:cNvPr id="4" name="Slide Number Placeholder 3"/>
+          <p:cNvSpPr>
+            <a:spLocks noGrp="1"/>
+          </p:cNvSpPr>
+          <p:nvPr>
+            <p:ph type="sldNum" sz="quarter" idx="5"/>
+          </p:nvPr>
+        </p:nvSpPr>
+        <p:spPr/>
+        <p:txBody>
+          <a:bodyPr/>
+          <a:lstStyle/>
+          <a:p>
+            <a:fld id="{A291FEE6-3CE6-48D3-A539-66492A8C3EBF}" type="slidenum">
+              <a:rPr lang="en-GB" smtClean="0"/>
+              <a:t>9</a:t>
+            </a:fld>
+            <a:endParaRPr lang="en-GB"/>
+          </a:p>
+        </p:txBody>
+      </p:sp>
+    </p:spTree>
+    <p:extLst>
+      <p:ext uri="{BB962C8B-B14F-4D97-AF65-F5344CB8AC3E}">
+        <p14:creationId xmlns:p14="http://schemas.microsoft.com/office/powerpoint/2010/main" val="1418818566"/>
       </p:ext>
     </p:extLst>
   </p:cSld>
@@ -2419,7 +3435,7 @@
           <a:p>
             <a:fld id="{6A40F7CE-1056-4AA7-918B-FDD9DDC9022B}" type="datetimeFigureOut">
               <a:rPr lang="en-GB" smtClean="0"/>
-              <a:t>20/05/2023</a:t>
+              <a:t>21/05/2023</a:t>
             </a:fld>
             <a:endParaRPr lang="en-GB"/>
           </a:p>
@@ -2619,7 +3635,7 @@
           <a:p>
             <a:fld id="{6A40F7CE-1056-4AA7-918B-FDD9DDC9022B}" type="datetimeFigureOut">
               <a:rPr lang="en-GB" smtClean="0"/>
-              <a:t>20/05/2023</a:t>
+              <a:t>21/05/2023</a:t>
             </a:fld>
             <a:endParaRPr lang="en-GB"/>
           </a:p>
@@ -2829,7 +3845,7 @@
           <a:p>
             <a:fld id="{6A40F7CE-1056-4AA7-918B-FDD9DDC9022B}" type="datetimeFigureOut">
               <a:rPr lang="en-GB" smtClean="0"/>
-              <a:t>20/05/2023</a:t>
+              <a:t>21/05/2023</a:t>
             </a:fld>
             <a:endParaRPr lang="en-GB"/>
           </a:p>
@@ -3029,7 +4045,7 @@
           <a:p>
             <a:fld id="{6A40F7CE-1056-4AA7-918B-FDD9DDC9022B}" type="datetimeFigureOut">
               <a:rPr lang="en-GB" smtClean="0"/>
-              <a:t>20/05/2023</a:t>
+              <a:t>21/05/2023</a:t>
             </a:fld>
             <a:endParaRPr lang="en-GB"/>
           </a:p>
@@ -3305,7 +4321,7 @@
           <a:p>
             <a:fld id="{6A40F7CE-1056-4AA7-918B-FDD9DDC9022B}" type="datetimeFigureOut">
               <a:rPr lang="en-GB" smtClean="0"/>
-              <a:t>20/05/2023</a:t>
+              <a:t>21/05/2023</a:t>
             </a:fld>
             <a:endParaRPr lang="en-GB"/>
           </a:p>
@@ -3573,7 +4589,7 @@
           <a:p>
             <a:fld id="{6A40F7CE-1056-4AA7-918B-FDD9DDC9022B}" type="datetimeFigureOut">
               <a:rPr lang="en-GB" smtClean="0"/>
-              <a:t>20/05/2023</a:t>
+              <a:t>21/05/2023</a:t>
             </a:fld>
             <a:endParaRPr lang="en-GB"/>
           </a:p>
@@ -3988,7 +5004,7 @@
           <a:p>
             <a:fld id="{6A40F7CE-1056-4AA7-918B-FDD9DDC9022B}" type="datetimeFigureOut">
               <a:rPr lang="en-GB" smtClean="0"/>
-              <a:t>20/05/2023</a:t>
+              <a:t>21/05/2023</a:t>
             </a:fld>
             <a:endParaRPr lang="en-GB"/>
           </a:p>
@@ -4130,7 +5146,7 @@
           <a:p>
             <a:fld id="{6A40F7CE-1056-4AA7-918B-FDD9DDC9022B}" type="datetimeFigureOut">
               <a:rPr lang="en-GB" smtClean="0"/>
-              <a:t>20/05/2023</a:t>
+              <a:t>21/05/2023</a:t>
             </a:fld>
             <a:endParaRPr lang="en-GB"/>
           </a:p>
@@ -4243,7 +5259,7 @@
           <a:p>
             <a:fld id="{6A40F7CE-1056-4AA7-918B-FDD9DDC9022B}" type="datetimeFigureOut">
               <a:rPr lang="en-GB" smtClean="0"/>
-              <a:t>20/05/2023</a:t>
+              <a:t>21/05/2023</a:t>
             </a:fld>
             <a:endParaRPr lang="en-GB"/>
           </a:p>
@@ -4556,7 +5572,7 @@
           <a:p>
             <a:fld id="{6A40F7CE-1056-4AA7-918B-FDD9DDC9022B}" type="datetimeFigureOut">
               <a:rPr lang="en-GB" smtClean="0"/>
-              <a:t>20/05/2023</a:t>
+              <a:t>21/05/2023</a:t>
             </a:fld>
             <a:endParaRPr lang="en-GB"/>
           </a:p>
@@ -4845,7 +5861,7 @@
           <a:p>
             <a:fld id="{6A40F7CE-1056-4AA7-918B-FDD9DDC9022B}" type="datetimeFigureOut">
               <a:rPr lang="en-GB" smtClean="0"/>
-              <a:t>20/05/2023</a:t>
+              <a:t>21/05/2023</a:t>
             </a:fld>
             <a:endParaRPr lang="en-GB"/>
           </a:p>
@@ -5088,7 +6104,7 @@
           <a:p>
             <a:fld id="{6A40F7CE-1056-4AA7-918B-FDD9DDC9022B}" type="datetimeFigureOut">
               <a:rPr lang="en-GB" smtClean="0"/>
-              <a:t>20/05/2023</a:t>
+              <a:t>21/05/2023</a:t>
             </a:fld>
             <a:endParaRPr lang="en-GB"/>
           </a:p>
@@ -6287,7 +7303,7 @@
           <p:nvPr/>
         </p:nvPicPr>
         <p:blipFill>
-          <a:blip r:embed="rId2"/>
+          <a:blip r:embed="rId3"/>
           <a:stretch>
             <a:fillRect/>
           </a:stretch>
@@ -6660,7 +7676,7 @@
           <p:nvPr/>
         </p:nvPicPr>
         <p:blipFill>
-          <a:blip r:embed="rId3"/>
+          <a:blip r:embed="rId4"/>
           <a:stretch>
             <a:fillRect/>
           </a:stretch>
@@ -6690,7 +7706,7 @@
           <p:nvPr/>
         </p:nvPicPr>
         <p:blipFill>
-          <a:blip r:embed="rId4"/>
+          <a:blip r:embed="rId5"/>
           <a:stretch>
             <a:fillRect/>
           </a:stretch>
@@ -7320,7 +8336,7 @@
           <p:nvPr/>
         </p:nvPicPr>
         <p:blipFill rotWithShape="1">
-          <a:blip r:embed="rId2"/>
+          <a:blip r:embed="rId3"/>
           <a:srcRect r="20419" b="3"/>
           <a:stretch/>
         </p:blipFill>
@@ -7420,7 +8436,7 @@
           <p:nvPr/>
         </p:nvPicPr>
         <p:blipFill>
-          <a:blip r:embed="rId3"/>
+          <a:blip r:embed="rId4"/>
           <a:stretch>
             <a:fillRect/>
           </a:stretch>
@@ -7450,7 +8466,7 @@
           <p:nvPr/>
         </p:nvPicPr>
         <p:blipFill>
-          <a:blip r:embed="rId4"/>
+          <a:blip r:embed="rId5"/>
           <a:stretch>
             <a:fillRect/>
           </a:stretch>
@@ -14375,7 +15391,7 @@
           <p:nvPr/>
         </p:nvPicPr>
         <p:blipFill>
-          <a:blip r:embed="rId2"/>
+          <a:blip r:embed="rId3"/>
           <a:stretch>
             <a:fillRect/>
           </a:stretch>
@@ -14573,7 +15589,7 @@
           <p:nvPr/>
         </p:nvPicPr>
         <p:blipFill>
-          <a:blip r:embed="rId2"/>
+          <a:blip r:embed="rId3"/>
           <a:stretch>
             <a:fillRect/>
           </a:stretch>

</xml_diff>